<commit_message>
Update UMM Distribution Company.pptx
</commit_message>
<xml_diff>
--- a/UMM Distribution Company.pptx
+++ b/UMM Distribution Company.pptx
@@ -3007,14 +3007,24 @@
           </a:xfrm>
         </p:spPr>
         <p:txBody>
-          <a:bodyPr/>
+          <a:bodyPr>
+            <a:normAutofit fontScale="90000"/>
+          </a:bodyPr>
           <a:lstStyle/>
           <a:p>
             <a:r>
               <a:rPr lang="en-US" b="1" dirty="0" smtClean="0"/>
-              <a:t>    UMM Distribution Company</a:t>
-            </a:r>
-            <a:endParaRPr lang="en-US" b="1" dirty="0"/>
+              <a:t>    </a:t>
+            </a:r>
+            <a:r>
+              <a:rPr lang="en-US" b="1" dirty="0" smtClean="0">
+                <a:latin typeface="Bodoni MT" panose="02070603080606020203" pitchFamily="18" charset="0"/>
+              </a:rPr>
+              <a:t>UMM Distribution Company</a:t>
+            </a:r>
+            <a:endParaRPr lang="en-US" b="1" dirty="0">
+              <a:latin typeface="Bodoni MT" panose="02070603080606020203" pitchFamily="18" charset="0"/>
+            </a:endParaRPr>
           </a:p>
         </p:txBody>
       </p:sp>
@@ -3915,7 +3925,7 @@
               <a:buChar char="•"/>
             </a:pPr>
             <a:r>
-              <a:rPr lang="en-US" b="1" dirty="0" smtClean="0">
+              <a:rPr lang="en-US" dirty="0" smtClean="0">
                 <a:latin typeface="Bodoni MT" panose="02070603080606020203" pitchFamily="18" charset="0"/>
               </a:rPr>
               <a:t>Polymorphism</a:t>
@@ -5944,7 +5954,7 @@
           <a:p>
             <a:r>
               <a:rPr lang="en-US" dirty="0" smtClean="0"/>
-              <a:t>Mange Expense </a:t>
+              <a:t>Manage Expense </a:t>
             </a:r>
             <a:r>
               <a:rPr lang="en-US" dirty="0"/>

</xml_diff>